<commit_message>
Added git hub reference
</commit_message>
<xml_diff>
--- a/Presentation.pptx
+++ b/Presentation.pptx
@@ -4992,7 +4992,9 @@
           </a:xfrm>
         </p:spPr>
         <p:txBody>
-          <a:bodyPr/>
+          <a:bodyPr>
+            <a:normAutofit lnSpcReduction="10000"/>
+          </a:bodyPr>
           <a:lstStyle/>
           <a:p>
             <a:pPr marL="0" indent="0" algn="ctr">
@@ -5050,6 +5052,47 @@
               <a:rPr lang="en-US" dirty="0" smtClean="0"/>
               <a:t>QUESTIONS?</a:t>
             </a:r>
+          </a:p>
+          <a:p>
+            <a:pPr marL="0" indent="0" algn="ctr">
+              <a:buNone/>
+            </a:pPr>
+            <a:endParaRPr lang="en-US" dirty="0" smtClean="0"/>
+          </a:p>
+          <a:p>
+            <a:pPr marL="0" indent="0" algn="ctr">
+              <a:buNone/>
+            </a:pPr>
+            <a:r>
+              <a:rPr lang="en-US" dirty="0">
+                <a:hlinkClick r:id="rId3"/>
+              </a:rPr>
+              <a:t>https://github.com/tomgreen98</a:t>
+            </a:r>
+            <a:r>
+              <a:rPr lang="en-US">
+                <a:hlinkClick r:id="rId3"/>
+              </a:rPr>
+              <a:t>/</a:t>
+            </a:r>
+            <a:r>
+              <a:rPr lang="en-US" smtClean="0">
+                <a:hlinkClick r:id="rId3"/>
+              </a:rPr>
+              <a:t>cpanelconf2013</a:t>
+            </a:r>
+            <a:endParaRPr lang="en-US" smtClean="0"/>
+          </a:p>
+          <a:p>
+            <a:pPr marL="0" indent="0" algn="ctr">
+              <a:buNone/>
+            </a:pPr>
+            <a:endParaRPr lang="en-US" dirty="0"/>
+          </a:p>
+          <a:p>
+            <a:pPr marL="0" indent="0" algn="ctr">
+              <a:buNone/>
+            </a:pPr>
             <a:endParaRPr lang="en-US" dirty="0"/>
           </a:p>
         </p:txBody>

</xml_diff>